<commit_message>
Versione 3 Andrea e Iacopo
</commit_message>
<xml_diff>
--- a/LabSession0 - Initial Setup with Docker.pptx
+++ b/LabSession0 - Initial Setup with Docker.pptx
@@ -227,7 +227,7 @@
           <a:p>
             <a:fld id="{2CC5598C-FF10-4AF1-BC63-A7C8964CD468}" type="datetimeFigureOut">
               <a:rPr lang="en-US" smtClean="0"/>
-              <a:t>9/26/2022</a:t>
+              <a:t>9/17/2024</a:t>
             </a:fld>
             <a:endParaRPr lang="en-US"/>
           </a:p>
@@ -7076,81 +7076,6 @@
       </p:sp>
       <p:sp>
         <p:nvSpPr>
-          <p:cNvPr id="16" name="Sottotitolo 15">
-            <a:extLst>
-              <a:ext uri="{FF2B5EF4-FFF2-40B4-BE49-F238E27FC236}">
-                <a16:creationId xmlns:a16="http://schemas.microsoft.com/office/drawing/2014/main" id="{1003F205-B3C3-43B7-A6C2-E3A1DCC7BD0E}"/>
-              </a:ext>
-            </a:extLst>
-          </p:cNvPr>
-          <p:cNvSpPr>
-            <a:spLocks noGrp="1"/>
-          </p:cNvSpPr>
-          <p:nvPr>
-            <p:ph type="subTitle" idx="1"/>
-          </p:nvPr>
-        </p:nvSpPr>
-        <p:spPr>
-          <a:xfrm>
-            <a:off x="387350" y="4656847"/>
-            <a:ext cx="8267700" cy="1267298"/>
-          </a:xfrm>
-        </p:spPr>
-        <p:txBody>
-          <a:bodyPr/>
-          <a:lstStyle/>
-          <a:p>
-            <a:r>
-              <a:rPr lang="en-US" sz="2800" dirty="0">
-                <a:latin typeface="Calibri" pitchFamily="34" charset="0"/>
-              </a:rPr>
-              <a:t>Prof: Luigi di Stefano - </a:t>
-            </a:r>
-            <a:r>
-              <a:rPr lang="en-US" sz="2800" u="sng" dirty="0">
-                <a:latin typeface="Calibri" pitchFamily="34" charset="0"/>
-              </a:rPr>
-              <a:t>luigi.distefano@unibo.it</a:t>
-            </a:r>
-            <a:br>
-              <a:rPr lang="en-US" sz="2800" dirty="0">
-                <a:latin typeface="Calibri" pitchFamily="34" charset="0"/>
-              </a:rPr>
-            </a:br>
-            <a:r>
-              <a:rPr lang="en-US" sz="2800" dirty="0">
-                <a:latin typeface="Calibri" pitchFamily="34" charset="0"/>
-              </a:rPr>
-              <a:t>T</a:t>
-            </a:r>
-            <a:r>
-              <a:rPr lang="en-US" dirty="0">
-                <a:latin typeface="Calibri" pitchFamily="34" charset="0"/>
-              </a:rPr>
-              <a:t>utors: Pierluigi Zama Ramirez - </a:t>
-            </a:r>
-            <a:r>
-              <a:rPr lang="en-US" dirty="0">
-                <a:latin typeface="Calibri" pitchFamily="34" charset="0"/>
-                <a:hlinkClick r:id="rId3"/>
-              </a:rPr>
-              <a:t>p</a:t>
-            </a:r>
-            <a:r>
-              <a:rPr lang="en-US" u="sng" dirty="0">
-                <a:latin typeface="Calibri" pitchFamily="34" charset="0"/>
-                <a:hlinkClick r:id="rId3"/>
-              </a:rPr>
-              <a:t>ierluigi.zama@unibo.it</a:t>
-            </a:r>
-            <a:endParaRPr lang="en-US" u="sng" dirty="0">
-              <a:latin typeface="Calibri" pitchFamily="34" charset="0"/>
-            </a:endParaRPr>
-          </a:p>
-        </p:txBody>
-      </p:sp>
-      <p:sp>
-        <p:nvSpPr>
           <p:cNvPr id="18" name="Segnaposto testo 17">
             <a:extLst>
               <a:ext uri="{FF2B5EF4-FFF2-40B4-BE49-F238E27FC236}">
@@ -7185,6 +7110,261 @@
               <a:t>Computer Vision and Image Processing</a:t>
             </a:r>
             <a:endParaRPr lang="en-GB" dirty="0"/>
+          </a:p>
+        </p:txBody>
+      </p:sp>
+      <p:sp>
+        <p:nvSpPr>
+          <p:cNvPr id="4" name="Sottotitolo 15">
+            <a:extLst>
+              <a:ext uri="{FF2B5EF4-FFF2-40B4-BE49-F238E27FC236}">
+                <a16:creationId xmlns:a16="http://schemas.microsoft.com/office/drawing/2014/main" id="{82ABF0A3-FF05-24EF-7E0F-06956BE79B3E}"/>
+              </a:ext>
+            </a:extLst>
+          </p:cNvPr>
+          <p:cNvSpPr txBox="1">
+            <a:spLocks/>
+          </p:cNvSpPr>
+          <p:nvPr/>
+        </p:nvSpPr>
+        <p:spPr>
+          <a:xfrm>
+            <a:off x="387350" y="4656847"/>
+            <a:ext cx="8267700" cy="1267298"/>
+          </a:xfrm>
+          <a:prstGeom prst="rect">
+            <a:avLst/>
+          </a:prstGeom>
+        </p:spPr>
+        <p:txBody>
+          <a:bodyPr/>
+          <a:lstStyle>
+            <a:lvl1pPr marL="0" indent="0" algn="ctr" defTabSz="914400" rtl="0" eaLnBrk="1" latinLnBrk="0" hangingPunct="1">
+              <a:lnSpc>
+                <a:spcPct val="90000"/>
+              </a:lnSpc>
+              <a:spcBef>
+                <a:spcPts val="1000"/>
+              </a:spcBef>
+              <a:buFont typeface="Arial" panose="020B0604020202020204" pitchFamily="34" charset="0"/>
+              <a:buNone/>
+              <a:defRPr sz="2400" kern="1200">
+                <a:solidFill>
+                  <a:srgbClr val="0070C0"/>
+                </a:solidFill>
+                <a:latin typeface="Tw Cen MT" panose="020B0602020104020603" pitchFamily="34" charset="0"/>
+                <a:ea typeface="+mn-ea"/>
+                <a:cs typeface="+mn-cs"/>
+              </a:defRPr>
+            </a:lvl1pPr>
+            <a:lvl2pPr marL="457200" indent="0" algn="ctr" defTabSz="914400" rtl="0" eaLnBrk="1" latinLnBrk="0" hangingPunct="1">
+              <a:lnSpc>
+                <a:spcPct val="90000"/>
+              </a:lnSpc>
+              <a:spcBef>
+                <a:spcPts val="500"/>
+              </a:spcBef>
+              <a:buFont typeface="Arial" panose="020B0604020202020204" pitchFamily="34" charset="0"/>
+              <a:buNone/>
+              <a:defRPr sz="2000" kern="1200">
+                <a:solidFill>
+                  <a:schemeClr val="tx1"/>
+                </a:solidFill>
+                <a:latin typeface="+mn-lt"/>
+                <a:ea typeface="+mn-ea"/>
+                <a:cs typeface="+mn-cs"/>
+              </a:defRPr>
+            </a:lvl2pPr>
+            <a:lvl3pPr marL="914400" indent="0" algn="ctr" defTabSz="914400" rtl="0" eaLnBrk="1" latinLnBrk="0" hangingPunct="1">
+              <a:lnSpc>
+                <a:spcPct val="90000"/>
+              </a:lnSpc>
+              <a:spcBef>
+                <a:spcPts val="500"/>
+              </a:spcBef>
+              <a:buFont typeface="Arial" panose="020B0604020202020204" pitchFamily="34" charset="0"/>
+              <a:buNone/>
+              <a:defRPr sz="1800" kern="1200">
+                <a:solidFill>
+                  <a:schemeClr val="tx1"/>
+                </a:solidFill>
+                <a:latin typeface="+mn-lt"/>
+                <a:ea typeface="+mn-ea"/>
+                <a:cs typeface="+mn-cs"/>
+              </a:defRPr>
+            </a:lvl3pPr>
+            <a:lvl4pPr marL="1371600" indent="0" algn="ctr" defTabSz="914400" rtl="0" eaLnBrk="1" latinLnBrk="0" hangingPunct="1">
+              <a:lnSpc>
+                <a:spcPct val="90000"/>
+              </a:lnSpc>
+              <a:spcBef>
+                <a:spcPts val="500"/>
+              </a:spcBef>
+              <a:buFont typeface="Arial" panose="020B0604020202020204" pitchFamily="34" charset="0"/>
+              <a:buNone/>
+              <a:defRPr sz="1600" kern="1200">
+                <a:solidFill>
+                  <a:schemeClr val="tx1"/>
+                </a:solidFill>
+                <a:latin typeface="+mn-lt"/>
+                <a:ea typeface="+mn-ea"/>
+                <a:cs typeface="+mn-cs"/>
+              </a:defRPr>
+            </a:lvl4pPr>
+            <a:lvl5pPr marL="1828800" indent="0" algn="ctr" defTabSz="914400" rtl="0" eaLnBrk="1" latinLnBrk="0" hangingPunct="1">
+              <a:lnSpc>
+                <a:spcPct val="90000"/>
+              </a:lnSpc>
+              <a:spcBef>
+                <a:spcPts val="500"/>
+              </a:spcBef>
+              <a:buFont typeface="Arial" panose="020B0604020202020204" pitchFamily="34" charset="0"/>
+              <a:buNone/>
+              <a:defRPr sz="1600" kern="1200">
+                <a:solidFill>
+                  <a:schemeClr val="tx1"/>
+                </a:solidFill>
+                <a:latin typeface="+mn-lt"/>
+                <a:ea typeface="+mn-ea"/>
+                <a:cs typeface="+mn-cs"/>
+              </a:defRPr>
+            </a:lvl5pPr>
+            <a:lvl6pPr marL="2286000" indent="0" algn="ctr" defTabSz="914400" rtl="0" eaLnBrk="1" latinLnBrk="0" hangingPunct="1">
+              <a:lnSpc>
+                <a:spcPct val="90000"/>
+              </a:lnSpc>
+              <a:spcBef>
+                <a:spcPts val="500"/>
+              </a:spcBef>
+              <a:buFont typeface="Arial" panose="020B0604020202020204" pitchFamily="34" charset="0"/>
+              <a:buNone/>
+              <a:defRPr sz="1600" kern="1200">
+                <a:solidFill>
+                  <a:schemeClr val="tx1"/>
+                </a:solidFill>
+                <a:latin typeface="+mn-lt"/>
+                <a:ea typeface="+mn-ea"/>
+                <a:cs typeface="+mn-cs"/>
+              </a:defRPr>
+            </a:lvl6pPr>
+            <a:lvl7pPr marL="2743200" indent="0" algn="ctr" defTabSz="914400" rtl="0" eaLnBrk="1" latinLnBrk="0" hangingPunct="1">
+              <a:lnSpc>
+                <a:spcPct val="90000"/>
+              </a:lnSpc>
+              <a:spcBef>
+                <a:spcPts val="500"/>
+              </a:spcBef>
+              <a:buFont typeface="Arial" panose="020B0604020202020204" pitchFamily="34" charset="0"/>
+              <a:buNone/>
+              <a:defRPr sz="1600" kern="1200">
+                <a:solidFill>
+                  <a:schemeClr val="tx1"/>
+                </a:solidFill>
+                <a:latin typeface="+mn-lt"/>
+                <a:ea typeface="+mn-ea"/>
+                <a:cs typeface="+mn-cs"/>
+              </a:defRPr>
+            </a:lvl7pPr>
+            <a:lvl8pPr marL="3200400" indent="0" algn="ctr" defTabSz="914400" rtl="0" eaLnBrk="1" latinLnBrk="0" hangingPunct="1">
+              <a:lnSpc>
+                <a:spcPct val="90000"/>
+              </a:lnSpc>
+              <a:spcBef>
+                <a:spcPts val="500"/>
+              </a:spcBef>
+              <a:buFont typeface="Arial" panose="020B0604020202020204" pitchFamily="34" charset="0"/>
+              <a:buNone/>
+              <a:defRPr sz="1600" kern="1200">
+                <a:solidFill>
+                  <a:schemeClr val="tx1"/>
+                </a:solidFill>
+                <a:latin typeface="+mn-lt"/>
+                <a:ea typeface="+mn-ea"/>
+                <a:cs typeface="+mn-cs"/>
+              </a:defRPr>
+            </a:lvl8pPr>
+            <a:lvl9pPr marL="3657600" indent="0" algn="ctr" defTabSz="914400" rtl="0" eaLnBrk="1" latinLnBrk="0" hangingPunct="1">
+              <a:lnSpc>
+                <a:spcPct val="90000"/>
+              </a:lnSpc>
+              <a:spcBef>
+                <a:spcPts val="500"/>
+              </a:spcBef>
+              <a:buFont typeface="Arial" panose="020B0604020202020204" pitchFamily="34" charset="0"/>
+              <a:buNone/>
+              <a:defRPr sz="1600" kern="1200">
+                <a:solidFill>
+                  <a:schemeClr val="tx1"/>
+                </a:solidFill>
+                <a:latin typeface="+mn-lt"/>
+                <a:ea typeface="+mn-ea"/>
+                <a:cs typeface="+mn-cs"/>
+              </a:defRPr>
+            </a:lvl9pPr>
+          </a:lstStyle>
+          <a:p>
+            <a:r>
+              <a:rPr lang="en-US" sz="2800">
+                <a:latin typeface="Calibri" pitchFamily="34" charset="0"/>
+              </a:rPr>
+              <a:t>Prof: Luigi di Stefano - </a:t>
+            </a:r>
+            <a:r>
+              <a:rPr lang="en-US" sz="2800" u="sng">
+                <a:latin typeface="Calibri" pitchFamily="34" charset="0"/>
+              </a:rPr>
+              <a:t>luigi.distefano@unibo.it</a:t>
+            </a:r>
+            <a:br>
+              <a:rPr lang="en-US" sz="2800">
+                <a:latin typeface="Calibri" pitchFamily="34" charset="0"/>
+              </a:rPr>
+            </a:br>
+            <a:r>
+              <a:rPr lang="en-US" sz="2800">
+                <a:latin typeface="Calibri" pitchFamily="34" charset="0"/>
+              </a:rPr>
+              <a:t>T</a:t>
+            </a:r>
+            <a:r>
+              <a:rPr lang="en-US">
+                <a:latin typeface="Calibri" pitchFamily="34" charset="0"/>
+              </a:rPr>
+              <a:t>utors: Andrea Amaduzzi - </a:t>
+            </a:r>
+            <a:r>
+              <a:rPr lang="en-US" u="sng">
+                <a:latin typeface="Calibri" pitchFamily="34" charset="0"/>
+                <a:hlinkClick r:id="rId3"/>
+              </a:rPr>
+              <a:t>andrea.amaduzzi4@unibo.it</a:t>
+            </a:r>
+            <a:r>
+              <a:rPr lang="en-US" u="sng">
+                <a:latin typeface="Calibri" pitchFamily="34" charset="0"/>
+              </a:rPr>
+              <a:t> </a:t>
+            </a:r>
+            <a:br>
+              <a:rPr lang="en-US" u="sng">
+                <a:latin typeface="Calibri" pitchFamily="34" charset="0"/>
+              </a:rPr>
+            </a:br>
+            <a:r>
+              <a:rPr lang="en-US">
+                <a:latin typeface="Calibri" pitchFamily="34" charset="0"/>
+              </a:rPr>
+              <a:t>Iacopo Curti - </a:t>
+            </a:r>
+            <a:r>
+              <a:rPr lang="en-US" u="sng">
+                <a:latin typeface="Calibri" pitchFamily="34" charset="0"/>
+              </a:rPr>
+              <a:t>iacopo.curti2@unibo.it</a:t>
+            </a:r>
+            <a:endParaRPr lang="en-US" u="sng" dirty="0">
+              <a:latin typeface="Calibri" pitchFamily="34" charset="0"/>
+            </a:endParaRPr>
           </a:p>
         </p:txBody>
       </p:sp>
@@ -7276,7 +7456,7 @@
           <a:p>
             <a:r>
               <a:rPr lang="en-US" dirty="0"/>
-              <a:t>Initial Setup – Pierluigi Zama Ramirez</a:t>
+              <a:t>Initial Setup – Andrea Amaduzzi</a:t>
             </a:r>
           </a:p>
         </p:txBody>
@@ -7829,7 +8009,7 @@
           <a:p>
             <a:r>
               <a:rPr lang="en-US" dirty="0"/>
-              <a:t>Initial Setup – Pierluigi Zama Ramirez</a:t>
+              <a:t>Initial Setup – Andrea Amaduzzi</a:t>
             </a:r>
           </a:p>
         </p:txBody>
@@ -8689,7 +8869,7 @@
           <a:p>
             <a:r>
               <a:rPr lang="en-US" dirty="0"/>
-              <a:t>Initial Setup – Pierluigi Zama Ramirez</a:t>
+              <a:t>Initial Setup – Andrea Amaduzzi</a:t>
             </a:r>
           </a:p>
         </p:txBody>
@@ -9061,7 +9241,7 @@
           <a:p>
             <a:r>
               <a:rPr lang="en-US" dirty="0"/>
-              <a:t>Initial Setup – Pierluigi Zama Ramirez</a:t>
+              <a:t>Initial Setup – Andrea Amaduzzi</a:t>
             </a:r>
           </a:p>
         </p:txBody>

</xml_diff>